<commit_message>
Add Drawing Lab Hide/Unhide test
</commit_message>
<xml_diff>
--- a/doc/test/DrawingLab/DrawingLab.pptx
+++ b/doc/test/DrawingLab/DrawingLab.pptx
@@ -120,7 +120,7 @@
       </p14:sectionLst>
     </p:ext>
     <p:ext uri="{EFAFB233-063F-42B5-8137-9DF3F51BA10A}">
-      <p15:sldGuideLst xmlns:p15="http://schemas.microsoft.com/office/powerpoint/2012/main" xmlns="">
+      <p15:sldGuideLst xmlns="" xmlns:p15="http://schemas.microsoft.com/office/powerpoint/2012/main">
         <p15:guide id="1" orient="horz" pos="2160">
           <p15:clr>
             <a:srgbClr val="A4A3A4"/>
@@ -219,7 +219,7 @@
           <a:p>
             <a:fld id="{C33977A5-270E-4E03-B118-17345E304686}" type="datetimeFigureOut">
               <a:rPr lang="en-US" smtClean="0"/>
-              <a:t>08-Feb-16</a:t>
+              <a:t>09-Feb-16</a:t>
             </a:fld>
             <a:endParaRPr lang="en-US"/>
           </a:p>
@@ -668,7 +668,7 @@
           <a:p>
             <a:fld id="{699DC775-C286-4358-8C92-D7E584E969B3}" type="datetimeFigureOut">
               <a:rPr lang="en-US" smtClean="0"/>
-              <a:t>08-Feb-16</a:t>
+              <a:t>09-Feb-16</a:t>
             </a:fld>
             <a:endParaRPr lang="en-US"/>
           </a:p>
@@ -838,7 +838,7 @@
           <a:p>
             <a:fld id="{699DC775-C286-4358-8C92-D7E584E969B3}" type="datetimeFigureOut">
               <a:rPr lang="en-US" smtClean="0"/>
-              <a:t>08-Feb-16</a:t>
+              <a:t>09-Feb-16</a:t>
             </a:fld>
             <a:endParaRPr lang="en-US"/>
           </a:p>
@@ -1018,7 +1018,7 @@
           <a:p>
             <a:fld id="{699DC775-C286-4358-8C92-D7E584E969B3}" type="datetimeFigureOut">
               <a:rPr lang="en-US" smtClean="0"/>
-              <a:t>08-Feb-16</a:t>
+              <a:t>09-Feb-16</a:t>
             </a:fld>
             <a:endParaRPr lang="en-US"/>
           </a:p>
@@ -1188,7 +1188,7 @@
           <a:p>
             <a:fld id="{699DC775-C286-4358-8C92-D7E584E969B3}" type="datetimeFigureOut">
               <a:rPr lang="en-US" smtClean="0"/>
-              <a:t>08-Feb-16</a:t>
+              <a:t>09-Feb-16</a:t>
             </a:fld>
             <a:endParaRPr lang="en-US"/>
           </a:p>
@@ -1430,7 +1430,7 @@
           <a:p>
             <a:fld id="{699DC775-C286-4358-8C92-D7E584E969B3}" type="datetimeFigureOut">
               <a:rPr lang="en-US" smtClean="0"/>
-              <a:t>08-Feb-16</a:t>
+              <a:t>09-Feb-16</a:t>
             </a:fld>
             <a:endParaRPr lang="en-US"/>
           </a:p>
@@ -1600,7 +1600,7 @@
           <a:p>
             <a:fld id="{699DC775-C286-4358-8C92-D7E584E969B3}" type="datetimeFigureOut">
               <a:rPr lang="en-US" smtClean="0"/>
-              <a:t>08-Feb-16</a:t>
+              <a:t>09-Feb-16</a:t>
             </a:fld>
             <a:endParaRPr lang="en-US"/>
           </a:p>
@@ -1846,7 +1846,7 @@
           <a:p>
             <a:fld id="{699DC775-C286-4358-8C92-D7E584E969B3}" type="datetimeFigureOut">
               <a:rPr lang="en-US" smtClean="0"/>
-              <a:t>08-Feb-16</a:t>
+              <a:t>09-Feb-16</a:t>
             </a:fld>
             <a:endParaRPr lang="en-US"/>
           </a:p>
@@ -2134,7 +2134,7 @@
           <a:p>
             <a:fld id="{699DC775-C286-4358-8C92-D7E584E969B3}" type="datetimeFigureOut">
               <a:rPr lang="en-US" smtClean="0"/>
-              <a:t>08-Feb-16</a:t>
+              <a:t>09-Feb-16</a:t>
             </a:fld>
             <a:endParaRPr lang="en-US"/>
           </a:p>
@@ -2556,7 +2556,7 @@
           <a:p>
             <a:fld id="{699DC775-C286-4358-8C92-D7E584E969B3}" type="datetimeFigureOut">
               <a:rPr lang="en-US" smtClean="0"/>
-              <a:t>08-Feb-16</a:t>
+              <a:t>09-Feb-16</a:t>
             </a:fld>
             <a:endParaRPr lang="en-US"/>
           </a:p>
@@ -2674,7 +2674,7 @@
           <a:p>
             <a:fld id="{699DC775-C286-4358-8C92-D7E584E969B3}" type="datetimeFigureOut">
               <a:rPr lang="en-US" smtClean="0"/>
-              <a:t>08-Feb-16</a:t>
+              <a:t>09-Feb-16</a:t>
             </a:fld>
             <a:endParaRPr lang="en-US"/>
           </a:p>
@@ -2769,7 +2769,7 @@
           <a:p>
             <a:fld id="{699DC775-C286-4358-8C92-D7E584E969B3}" type="datetimeFigureOut">
               <a:rPr lang="en-US" smtClean="0"/>
-              <a:t>08-Feb-16</a:t>
+              <a:t>09-Feb-16</a:t>
             </a:fld>
             <a:endParaRPr lang="en-US"/>
           </a:p>
@@ -2939,7 +2939,7 @@
           <a:p>
             <a:fld id="{699DC775-C286-4358-8C92-D7E584E969B3}" type="datetimeFigureOut">
               <a:rPr lang="en-US" smtClean="0"/>
-              <a:t>08-Feb-16</a:t>
+              <a:t>09-Feb-16</a:t>
             </a:fld>
             <a:endParaRPr lang="en-US"/>
           </a:p>
@@ -3216,7 +3216,7 @@
           <a:p>
             <a:fld id="{699DC775-C286-4358-8C92-D7E584E969B3}" type="datetimeFigureOut">
               <a:rPr lang="en-US" smtClean="0"/>
-              <a:t>08-Feb-16</a:t>
+              <a:t>09-Feb-16</a:t>
             </a:fld>
             <a:endParaRPr lang="en-US"/>
           </a:p>
@@ -3469,7 +3469,7 @@
           <a:p>
             <a:fld id="{699DC775-C286-4358-8C92-D7E584E969B3}" type="datetimeFigureOut">
               <a:rPr lang="en-US" smtClean="0"/>
-              <a:t>08-Feb-16</a:t>
+              <a:t>09-Feb-16</a:t>
             </a:fld>
             <a:endParaRPr lang="en-US"/>
           </a:p>
@@ -3639,7 +3639,7 @@
           <a:p>
             <a:fld id="{699DC775-C286-4358-8C92-D7E584E969B3}" type="datetimeFigureOut">
               <a:rPr lang="en-US" smtClean="0"/>
-              <a:t>08-Feb-16</a:t>
+              <a:t>09-Feb-16</a:t>
             </a:fld>
             <a:endParaRPr lang="en-US"/>
           </a:p>
@@ -3819,7 +3819,7 @@
           <a:p>
             <a:fld id="{699DC775-C286-4358-8C92-D7E584E969B3}" type="datetimeFigureOut">
               <a:rPr lang="en-US" smtClean="0"/>
-              <a:t>08-Feb-16</a:t>
+              <a:t>09-Feb-16</a:t>
             </a:fld>
             <a:endParaRPr lang="en-US"/>
           </a:p>
@@ -3989,7 +3989,7 @@
           <a:p>
             <a:fld id="{699DC775-C286-4358-8C92-D7E584E969B3}" type="datetimeFigureOut">
               <a:rPr lang="en-US" smtClean="0"/>
-              <a:t>08-Feb-16</a:t>
+              <a:t>09-Feb-16</a:t>
             </a:fld>
             <a:endParaRPr lang="en-US"/>
           </a:p>
@@ -4239,7 +4239,7 @@
           <a:p>
             <a:fld id="{699DC775-C286-4358-8C92-D7E584E969B3}" type="datetimeFigureOut">
               <a:rPr lang="en-US" smtClean="0"/>
-              <a:t>08-Feb-16</a:t>
+              <a:t>09-Feb-16</a:t>
             </a:fld>
             <a:endParaRPr lang="en-US"/>
           </a:p>
@@ -4417,7 +4417,7 @@
           <a:p>
             <a:fld id="{699DC775-C286-4358-8C92-D7E584E969B3}" type="datetimeFigureOut">
               <a:rPr lang="en-US" smtClean="0"/>
-              <a:t>08-Feb-16</a:t>
+              <a:t>09-Feb-16</a:t>
             </a:fld>
             <a:endParaRPr lang="en-US"/>
           </a:p>
@@ -4671,7 +4671,7 @@
           <a:p>
             <a:fld id="{699DC775-C286-4358-8C92-D7E584E969B3}" type="datetimeFigureOut">
               <a:rPr lang="en-US" smtClean="0"/>
-              <a:t>08-Feb-16</a:t>
+              <a:t>09-Feb-16</a:t>
             </a:fld>
             <a:endParaRPr lang="en-US"/>
           </a:p>
@@ -4967,7 +4967,7 @@
           <a:p>
             <a:fld id="{699DC775-C286-4358-8C92-D7E584E969B3}" type="datetimeFigureOut">
               <a:rPr lang="en-US" smtClean="0"/>
-              <a:t>08-Feb-16</a:t>
+              <a:t>09-Feb-16</a:t>
             </a:fld>
             <a:endParaRPr lang="en-US"/>
           </a:p>
@@ -5397,7 +5397,7 @@
           <a:p>
             <a:fld id="{699DC775-C286-4358-8C92-D7E584E969B3}" type="datetimeFigureOut">
               <a:rPr lang="en-US" smtClean="0"/>
-              <a:t>08-Feb-16</a:t>
+              <a:t>09-Feb-16</a:t>
             </a:fld>
             <a:endParaRPr lang="en-US"/>
           </a:p>
@@ -5643,7 +5643,7 @@
           <a:p>
             <a:fld id="{699DC775-C286-4358-8C92-D7E584E969B3}" type="datetimeFigureOut">
               <a:rPr lang="en-US" smtClean="0"/>
-              <a:t>08-Feb-16</a:t>
+              <a:t>09-Feb-16</a:t>
             </a:fld>
             <a:endParaRPr lang="en-US"/>
           </a:p>
@@ -5769,7 +5769,7 @@
           <a:p>
             <a:fld id="{699DC775-C286-4358-8C92-D7E584E969B3}" type="datetimeFigureOut">
               <a:rPr lang="en-US" smtClean="0"/>
-              <a:t>08-Feb-16</a:t>
+              <a:t>09-Feb-16</a:t>
             </a:fld>
             <a:endParaRPr lang="en-US"/>
           </a:p>
@@ -5872,7 +5872,7 @@
           <a:p>
             <a:fld id="{699DC775-C286-4358-8C92-D7E584E969B3}" type="datetimeFigureOut">
               <a:rPr lang="en-US" smtClean="0"/>
-              <a:t>08-Feb-16</a:t>
+              <a:t>09-Feb-16</a:t>
             </a:fld>
             <a:endParaRPr lang="en-US"/>
           </a:p>
@@ -6157,7 +6157,7 @@
           <a:p>
             <a:fld id="{699DC775-C286-4358-8C92-D7E584E969B3}" type="datetimeFigureOut">
               <a:rPr lang="en-US" smtClean="0"/>
-              <a:t>08-Feb-16</a:t>
+              <a:t>09-Feb-16</a:t>
             </a:fld>
             <a:endParaRPr lang="en-US"/>
           </a:p>
@@ -6418,7 +6418,7 @@
           <a:p>
             <a:fld id="{699DC775-C286-4358-8C92-D7E584E969B3}" type="datetimeFigureOut">
               <a:rPr lang="en-US" smtClean="0"/>
-              <a:t>08-Feb-16</a:t>
+              <a:t>09-Feb-16</a:t>
             </a:fld>
             <a:endParaRPr lang="en-US"/>
           </a:p>
@@ -6596,7 +6596,7 @@
           <a:p>
             <a:fld id="{699DC775-C286-4358-8C92-D7E584E969B3}" type="datetimeFigureOut">
               <a:rPr lang="en-US" smtClean="0"/>
-              <a:t>08-Feb-16</a:t>
+              <a:t>09-Feb-16</a:t>
             </a:fld>
             <a:endParaRPr lang="en-US"/>
           </a:p>
@@ -6784,7 +6784,7 @@
           <a:p>
             <a:fld id="{699DC775-C286-4358-8C92-D7E584E969B3}" type="datetimeFigureOut">
               <a:rPr lang="en-US" smtClean="0"/>
-              <a:t>08-Feb-16</a:t>
+              <a:t>09-Feb-16</a:t>
             </a:fld>
             <a:endParaRPr lang="en-US"/>
           </a:p>
@@ -6954,7 +6954,7 @@
           <a:p>
             <a:fld id="{699DC775-C286-4358-8C92-D7E584E969B3}" type="datetimeFigureOut">
               <a:rPr lang="en-US" smtClean="0"/>
-              <a:t>08-Feb-16</a:t>
+              <a:t>09-Feb-16</a:t>
             </a:fld>
             <a:endParaRPr lang="en-US"/>
           </a:p>
@@ -7242,7 +7242,7 @@
           <a:p>
             <a:fld id="{699DC775-C286-4358-8C92-D7E584E969B3}" type="datetimeFigureOut">
               <a:rPr lang="en-US" smtClean="0"/>
-              <a:t>08-Feb-16</a:t>
+              <a:t>09-Feb-16</a:t>
             </a:fld>
             <a:endParaRPr lang="en-US"/>
           </a:p>
@@ -7664,7 +7664,7 @@
           <a:p>
             <a:fld id="{699DC775-C286-4358-8C92-D7E584E969B3}" type="datetimeFigureOut">
               <a:rPr lang="en-US" smtClean="0"/>
-              <a:t>08-Feb-16</a:t>
+              <a:t>09-Feb-16</a:t>
             </a:fld>
             <a:endParaRPr lang="en-US"/>
           </a:p>
@@ -7782,7 +7782,7 @@
           <a:p>
             <a:fld id="{699DC775-C286-4358-8C92-D7E584E969B3}" type="datetimeFigureOut">
               <a:rPr lang="en-US" smtClean="0"/>
-              <a:t>08-Feb-16</a:t>
+              <a:t>09-Feb-16</a:t>
             </a:fld>
             <a:endParaRPr lang="en-US"/>
           </a:p>
@@ -7877,7 +7877,7 @@
           <a:p>
             <a:fld id="{699DC775-C286-4358-8C92-D7E584E969B3}" type="datetimeFigureOut">
               <a:rPr lang="en-US" smtClean="0"/>
-              <a:t>08-Feb-16</a:t>
+              <a:t>09-Feb-16</a:t>
             </a:fld>
             <a:endParaRPr lang="en-US"/>
           </a:p>
@@ -8154,7 +8154,7 @@
           <a:p>
             <a:fld id="{699DC775-C286-4358-8C92-D7E584E969B3}" type="datetimeFigureOut">
               <a:rPr lang="en-US" smtClean="0"/>
-              <a:t>08-Feb-16</a:t>
+              <a:t>09-Feb-16</a:t>
             </a:fld>
             <a:endParaRPr lang="en-US"/>
           </a:p>
@@ -8407,7 +8407,7 @@
           <a:p>
             <a:fld id="{699DC775-C286-4358-8C92-D7E584E969B3}" type="datetimeFigureOut">
               <a:rPr lang="en-US" smtClean="0"/>
-              <a:t>08-Feb-16</a:t>
+              <a:t>09-Feb-16</a:t>
             </a:fld>
             <a:endParaRPr lang="en-US"/>
           </a:p>
@@ -8620,7 +8620,7 @@
           <a:p>
             <a:fld id="{699DC775-C286-4358-8C92-D7E584E969B3}" type="datetimeFigureOut">
               <a:rPr lang="en-US" smtClean="0"/>
-              <a:t>08-Feb-16</a:t>
+              <a:t>09-Feb-16</a:t>
             </a:fld>
             <a:endParaRPr lang="en-US"/>
           </a:p>
@@ -9136,7 +9136,7 @@
           <a:p>
             <a:fld id="{699DC775-C286-4358-8C92-D7E584E969B3}" type="datetimeFigureOut">
               <a:rPr lang="en-US" smtClean="0"/>
-              <a:t>08-Feb-16</a:t>
+              <a:t>09-Feb-16</a:t>
             </a:fld>
             <a:endParaRPr lang="en-US"/>
           </a:p>
@@ -9650,7 +9650,7 @@
           <a:p>
             <a:fld id="{699DC775-C286-4358-8C92-D7E584E969B3}" type="datetimeFigureOut">
               <a:rPr lang="en-US" smtClean="0"/>
-              <a:t>08-Feb-16</a:t>
+              <a:t>09-Feb-16</a:t>
             </a:fld>
             <a:endParaRPr lang="en-US"/>
           </a:p>
@@ -10210,6 +10210,46 @@
           </a:fontRef>
         </p:style>
       </p:cxnSp>
+      <p:sp>
+        <p:nvSpPr>
+          <p:cNvPr id="2" name="HiddenCircle" hidden="1"/>
+          <p:cNvSpPr/>
+          <p:nvPr/>
+        </p:nvSpPr>
+        <p:spPr>
+          <a:xfrm>
+            <a:off x="4914900" y="152400"/>
+            <a:ext cx="3352800" cy="3352800"/>
+          </a:xfrm>
+          <a:prstGeom prst="ellipse">
+            <a:avLst/>
+          </a:prstGeom>
+        </p:spPr>
+        <p:style>
+          <a:lnRef idx="2">
+            <a:schemeClr val="accent1">
+              <a:shade val="50000"/>
+            </a:schemeClr>
+          </a:lnRef>
+          <a:fillRef idx="1">
+            <a:schemeClr val="accent1"/>
+          </a:fillRef>
+          <a:effectRef idx="0">
+            <a:schemeClr val="accent1"/>
+          </a:effectRef>
+          <a:fontRef idx="minor">
+            <a:schemeClr val="lt1"/>
+          </a:fontRef>
+        </p:style>
+        <p:txBody>
+          <a:bodyPr rtlCol="0" anchor="ctr"/>
+          <a:lstStyle/>
+          <a:p>
+            <a:pPr algn="ctr"/>
+            <a:endParaRPr lang="en-US"/>
+          </a:p>
+        </p:txBody>
+      </p:sp>
     </p:spTree>
     <p:extLst>
       <p:ext uri="{BB962C8B-B14F-4D97-AF65-F5344CB8AC3E}">

</xml_diff>